<commit_message>
PS11 and PS12 small changes
</commit_message>
<xml_diff>
--- a/practice_sessions/resources/ps11/tree.pptx
+++ b/practice_sessions/resources/ps11/tree.pptx
@@ -256,7 +256,7 @@
           <a:p>
             <a:fld id="{22CF7D58-EA2D-48D9-A9C1-56A99D372281}" type="datetimeFigureOut">
               <a:rPr lang="he-IL" smtClean="0"/>
-              <a:t>כ"ה/אדר/תשפ"א</a:t>
+              <a:t>י"ד/אייר/תשפ"א</a:t>
             </a:fld>
             <a:endParaRPr lang="he-IL"/>
           </a:p>
@@ -426,7 +426,7 @@
           <a:p>
             <a:fld id="{22CF7D58-EA2D-48D9-A9C1-56A99D372281}" type="datetimeFigureOut">
               <a:rPr lang="he-IL" smtClean="0"/>
-              <a:t>כ"ה/אדר/תשפ"א</a:t>
+              <a:t>י"ד/אייר/תשפ"א</a:t>
             </a:fld>
             <a:endParaRPr lang="he-IL"/>
           </a:p>
@@ -606,7 +606,7 @@
           <a:p>
             <a:fld id="{22CF7D58-EA2D-48D9-A9C1-56A99D372281}" type="datetimeFigureOut">
               <a:rPr lang="he-IL" smtClean="0"/>
-              <a:t>כ"ה/אדר/תשפ"א</a:t>
+              <a:t>י"ד/אייר/תשפ"א</a:t>
             </a:fld>
             <a:endParaRPr lang="he-IL"/>
           </a:p>
@@ -776,7 +776,7 @@
           <a:p>
             <a:fld id="{22CF7D58-EA2D-48D9-A9C1-56A99D372281}" type="datetimeFigureOut">
               <a:rPr lang="he-IL" smtClean="0"/>
-              <a:t>כ"ה/אדר/תשפ"א</a:t>
+              <a:t>י"ד/אייר/תשפ"א</a:t>
             </a:fld>
             <a:endParaRPr lang="he-IL"/>
           </a:p>
@@ -1022,7 +1022,7 @@
           <a:p>
             <a:fld id="{22CF7D58-EA2D-48D9-A9C1-56A99D372281}" type="datetimeFigureOut">
               <a:rPr lang="he-IL" smtClean="0"/>
-              <a:t>כ"ה/אדר/תשפ"א</a:t>
+              <a:t>י"ד/אייר/תשפ"א</a:t>
             </a:fld>
             <a:endParaRPr lang="he-IL"/>
           </a:p>
@@ -1254,7 +1254,7 @@
           <a:p>
             <a:fld id="{22CF7D58-EA2D-48D9-A9C1-56A99D372281}" type="datetimeFigureOut">
               <a:rPr lang="he-IL" smtClean="0"/>
-              <a:t>כ"ה/אדר/תשפ"א</a:t>
+              <a:t>י"ד/אייר/תשפ"א</a:t>
             </a:fld>
             <a:endParaRPr lang="he-IL"/>
           </a:p>
@@ -1621,7 +1621,7 @@
           <a:p>
             <a:fld id="{22CF7D58-EA2D-48D9-A9C1-56A99D372281}" type="datetimeFigureOut">
               <a:rPr lang="he-IL" smtClean="0"/>
-              <a:t>כ"ה/אדר/תשפ"א</a:t>
+              <a:t>י"ד/אייר/תשפ"א</a:t>
             </a:fld>
             <a:endParaRPr lang="he-IL"/>
           </a:p>
@@ -1739,7 +1739,7 @@
           <a:p>
             <a:fld id="{22CF7D58-EA2D-48D9-A9C1-56A99D372281}" type="datetimeFigureOut">
               <a:rPr lang="he-IL" smtClean="0"/>
-              <a:t>כ"ה/אדר/תשפ"א</a:t>
+              <a:t>י"ד/אייר/תשפ"א</a:t>
             </a:fld>
             <a:endParaRPr lang="he-IL"/>
           </a:p>
@@ -1834,7 +1834,7 @@
           <a:p>
             <a:fld id="{22CF7D58-EA2D-48D9-A9C1-56A99D372281}" type="datetimeFigureOut">
               <a:rPr lang="he-IL" smtClean="0"/>
-              <a:t>כ"ה/אדר/תשפ"א</a:t>
+              <a:t>י"ד/אייר/תשפ"א</a:t>
             </a:fld>
             <a:endParaRPr lang="he-IL"/>
           </a:p>
@@ -2111,7 +2111,7 @@
           <a:p>
             <a:fld id="{22CF7D58-EA2D-48D9-A9C1-56A99D372281}" type="datetimeFigureOut">
               <a:rPr lang="he-IL" smtClean="0"/>
-              <a:t>כ"ה/אדר/תשפ"א</a:t>
+              <a:t>י"ד/אייר/תשפ"א</a:t>
             </a:fld>
             <a:endParaRPr lang="he-IL"/>
           </a:p>
@@ -2364,7 +2364,7 @@
           <a:p>
             <a:fld id="{22CF7D58-EA2D-48D9-A9C1-56A99D372281}" type="datetimeFigureOut">
               <a:rPr lang="he-IL" smtClean="0"/>
-              <a:t>כ"ה/אדר/תשפ"א</a:t>
+              <a:t>י"ד/אייר/תשפ"א</a:t>
             </a:fld>
             <a:endParaRPr lang="he-IL"/>
           </a:p>
@@ -2577,7 +2577,7 @@
           <a:p>
             <a:fld id="{22CF7D58-EA2D-48D9-A9C1-56A99D372281}" type="datetimeFigureOut">
               <a:rPr lang="he-IL" smtClean="0"/>
-              <a:t>כ"ה/אדר/תשפ"א</a:t>
+              <a:t>י"ד/אייר/תשפ"א</a:t>
             </a:fld>
             <a:endParaRPr lang="he-IL"/>
           </a:p>
@@ -4507,15 +4507,7 @@
                   <a:schemeClr val="tx1"/>
                 </a:solidFill>
               </a:rPr>
-              <a:t>    {</a:t>
-            </a:r>
-            <a:r>
-              <a:rPr lang="en-US" smtClean="0">
-                <a:solidFill>
-                  <a:schemeClr val="tx1"/>
-                </a:solidFill>
-              </a:rPr>
-              <a:t>Input2_1=n5</a:t>
+              <a:t>    {Input2_1=n5</a:t>
             </a:r>
             <a:r>
               <a:rPr lang="en-US">
@@ -7431,13 +7423,15 @@
       <p:grpSp>
         <p:nvGrpSpPr>
           <p:cNvPr id="26" name="קבוצה 25"/>
-          <p:cNvGrpSpPr/>
+          <p:cNvGrpSpPr>
+            <a:grpSpLocks noChangeAspect="1"/>
+          </p:cNvGrpSpPr>
           <p:nvPr/>
         </p:nvGrpSpPr>
         <p:grpSpPr>
           <a:xfrm>
-            <a:off x="1404288" y="193534"/>
-            <a:ext cx="6152213" cy="4319845"/>
+            <a:off x="1404287" y="193534"/>
+            <a:ext cx="5217188" cy="3663307"/>
             <a:chOff x="1404288" y="193534"/>
             <a:chExt cx="6152213" cy="4319845"/>
           </a:xfrm>
@@ -7485,7 +7479,7 @@
             <a:p>
               <a:pPr algn="ctr" rtl="0"/>
               <a:r>
-                <a:rPr lang="en-US">
+                <a:rPr lang="en-US" sz="1500">
                   <a:solidFill>
                     <a:schemeClr val="tx1"/>
                   </a:solidFill>
@@ -7538,7 +7532,7 @@
             <a:p>
               <a:pPr algn="ctr" rtl="0"/>
               <a:r>
-                <a:rPr lang="en-US">
+                <a:rPr lang="en-US" sz="1500">
                   <a:solidFill>
                     <a:schemeClr val="tx1"/>
                   </a:solidFill>
@@ -7549,7 +7543,7 @@
             <a:p>
               <a:pPr algn="ctr" rtl="0"/>
               <a:r>
-                <a:rPr lang="en-US">
+                <a:rPr lang="en-US" sz="1500">
                   <a:solidFill>
                     <a:schemeClr val="tx1"/>
                   </a:solidFill>
@@ -7602,7 +7596,7 @@
             <a:p>
               <a:pPr algn="ctr" rtl="0"/>
               <a:r>
-                <a:rPr lang="en-US">
+                <a:rPr lang="en-US" sz="1500" dirty="0">
                   <a:solidFill>
                     <a:schemeClr val="tx1"/>
                   </a:solidFill>
@@ -7613,12 +7607,20 @@
             <a:p>
               <a:pPr algn="ctr" rtl="0"/>
               <a:r>
-                <a:rPr lang="en-US">
+                <a:rPr lang="en-US" sz="1500" dirty="0" err="1">
                   <a:solidFill>
                     <a:schemeClr val="tx1"/>
                   </a:solidFill>
                 </a:rPr>
-                <a:t>satisfiable(yes)</a:t>
+                <a:t>satisfiable</a:t>
+              </a:r>
+              <a:r>
+                <a:rPr lang="en-US" sz="1500" dirty="0">
+                  <a:solidFill>
+                    <a:schemeClr val="tx1"/>
+                  </a:solidFill>
+                </a:rPr>
+                <a:t>(yes)</a:t>
               </a:r>
             </a:p>
           </p:txBody>
@@ -7666,14 +7668,14 @@
             <a:p>
               <a:pPr algn="ctr" rtl="0"/>
               <a:r>
-                <a:rPr lang="en-US" smtClean="0">
+                <a:rPr lang="en-US" sz="1500" smtClean="0">
                   <a:solidFill>
                     <a:schemeClr val="tx1"/>
                   </a:solidFill>
                 </a:rPr>
                 <a:t>satisfiable(yes)</a:t>
               </a:r>
-              <a:endParaRPr lang="en-US">
+              <a:endParaRPr lang="en-US" sz="1500">
                 <a:solidFill>
                   <a:schemeClr val="tx1"/>
                 </a:solidFill>
@@ -7729,14 +7731,14 @@
             <a:p>
               <a:pPr algn="ctr"/>
               <a:r>
-                <a:rPr lang="en-US" smtClean="0">
+                <a:rPr lang="en-US" sz="1500" smtClean="0">
                   <a:solidFill>
                     <a:schemeClr val="tx1"/>
                   </a:solidFill>
                 </a:rPr>
                 <a:t>true</a:t>
               </a:r>
-              <a:endParaRPr lang="he-IL">
+              <a:endParaRPr lang="he-IL" sz="1500">
                 <a:solidFill>
                   <a:schemeClr val="tx1"/>
                 </a:solidFill>
@@ -7937,7 +7939,7 @@
             <a:p>
               <a:pPr algn="ctr" rtl="0"/>
               <a:r>
-                <a:rPr lang="en-US" smtClean="0">
+                <a:rPr lang="en-US" sz="1500" smtClean="0">
                   <a:solidFill>
                     <a:schemeClr val="tx1"/>
                   </a:solidFill>
@@ -7945,7 +7947,7 @@
                 <a:t>{X_1=not(no</a:t>
               </a:r>
               <a:r>
-                <a:rPr lang="en-US">
+                <a:rPr lang="en-US" sz="1500">
                   <a:solidFill>
                     <a:schemeClr val="tx1"/>
                   </a:solidFill>
@@ -7953,7 +7955,7 @@
                 <a:t>), Y_1=yes</a:t>
               </a:r>
               <a:r>
-                <a:rPr lang="en-US" smtClean="0">
+                <a:rPr lang="en-US" sz="1500" smtClean="0">
                   <a:solidFill>
                     <a:schemeClr val="tx1"/>
                   </a:solidFill>
@@ -7964,14 +7966,14 @@
             <a:p>
               <a:pPr algn="ctr" rtl="0"/>
               <a:r>
-                <a:rPr lang="en-US" smtClean="0">
+                <a:rPr lang="en-US" sz="1500" smtClean="0">
                   <a:solidFill>
                     <a:schemeClr val="tx1"/>
                   </a:solidFill>
                 </a:rPr>
-                <a:t>1</a:t>
+                <a:t>2</a:t>
               </a:r>
-              <a:endParaRPr lang="he-IL">
+              <a:endParaRPr lang="he-IL" sz="1500">
                 <a:solidFill>
                   <a:schemeClr val="tx1"/>
                 </a:solidFill>
@@ -8020,7 +8022,7 @@
             <a:p>
               <a:pPr algn="ctr" rtl="0"/>
               <a:r>
-                <a:rPr lang="en-US">
+                <a:rPr lang="en-US" sz="1500">
                   <a:solidFill>
                     <a:schemeClr val="tx1"/>
                   </a:solidFill>
@@ -8031,14 +8033,14 @@
             <a:p>
               <a:pPr algn="ctr" rtl="0"/>
               <a:r>
-                <a:rPr lang="en-US" smtClean="0">
+                <a:rPr lang="en-US" sz="1500" smtClean="0">
                   <a:solidFill>
                     <a:schemeClr val="tx1"/>
                   </a:solidFill>
                 </a:rPr>
                 <a:t>5</a:t>
               </a:r>
-              <a:endParaRPr lang="he-IL">
+              <a:endParaRPr lang="he-IL" sz="1500">
                 <a:solidFill>
                   <a:schemeClr val="tx1"/>
                 </a:solidFill>
@@ -8087,14 +8089,14 @@
             <a:p>
               <a:pPr algn="ctr" rtl="0"/>
               <a:r>
-                <a:rPr lang="en-US" smtClean="0">
+                <a:rPr lang="en-US" sz="1500" smtClean="0">
                   <a:solidFill>
                     <a:schemeClr val="tx1"/>
                   </a:solidFill>
                 </a:rPr>
                 <a:t>1</a:t>
               </a:r>
-              <a:endParaRPr lang="he-IL">
+              <a:endParaRPr lang="he-IL" sz="1500">
                 <a:solidFill>
                   <a:schemeClr val="tx1"/>
                 </a:solidFill>
@@ -8143,14 +8145,14 @@
             <a:p>
               <a:pPr algn="ctr" rtl="0"/>
               <a:r>
-                <a:rPr lang="en-US" smtClean="0">
+                <a:rPr lang="en-US" sz="1500" smtClean="0">
                   <a:solidFill>
                     <a:schemeClr val="tx1"/>
                   </a:solidFill>
                 </a:rPr>
                 <a:t>1</a:t>
               </a:r>
-              <a:endParaRPr lang="he-IL">
+              <a:endParaRPr lang="he-IL" sz="1500">
                 <a:solidFill>
                   <a:schemeClr val="tx1"/>
                 </a:solidFill>
@@ -8205,7 +8207,7 @@
             <a:lstStyle/>
             <a:p>
               <a:pPr algn="ctr"/>
-              <a:endParaRPr lang="he-IL" u="sng">
+              <a:endParaRPr lang="he-IL" sz="1500" u="sng">
                 <a:solidFill>
                   <a:schemeClr val="tx1"/>
                 </a:solidFill>
@@ -8260,7 +8262,7 @@
             <a:lstStyle/>
             <a:p>
               <a:pPr algn="ctr"/>
-              <a:endParaRPr lang="he-IL" u="sng">
+              <a:endParaRPr lang="he-IL" sz="1500" u="sng">
                 <a:solidFill>
                   <a:schemeClr val="tx1"/>
                 </a:solidFill>
@@ -8315,7 +8317,7 @@
             <a:lstStyle/>
             <a:p>
               <a:pPr algn="ctr"/>
-              <a:endParaRPr lang="he-IL" u="sng">
+              <a:endParaRPr lang="he-IL" sz="1500" u="sng">
                 <a:solidFill>
                   <a:schemeClr val="tx1"/>
                 </a:solidFill>
@@ -8370,7 +8372,7 @@
             <a:lstStyle/>
             <a:p>
               <a:pPr algn="ctr"/>
-              <a:endParaRPr lang="he-IL" u="sng">
+              <a:endParaRPr lang="he-IL" sz="1500" u="sng">
                 <a:solidFill>
                   <a:schemeClr val="tx1"/>
                 </a:solidFill>

</xml_diff>